<commit_message>
Updated links in map
</commit_message>
<xml_diff>
--- a/assets/ZTLabGuideMap.pptx
+++ b/assets/ZTLabGuideMap.pptx
@@ -3592,7 +3592,6 @@
       <p:sp>
         <p:nvSpPr>
           <p:cNvPr id="46" name="Flowchart: Alternate Process 45">
-            <a:hlinkClick r:id="rId9"/>
             <a:extLst>
               <a:ext uri="{FF2B5EF4-FFF2-40B4-BE49-F238E27FC236}">
                 <a16:creationId xmlns:a16="http://schemas.microsoft.com/office/drawing/2014/main" id="{AF5781CB-C8EE-B62C-6F0A-A71DA55E1F2B}"/>
@@ -3775,7 +3774,7 @@
       <p:sp>
         <p:nvSpPr>
           <p:cNvPr id="67" name="Flowchart: Alternate Process 66">
-            <a:hlinkClick r:id="rId10"/>
+            <a:hlinkClick r:id="rId9"/>
             <a:extLst>
               <a:ext uri="{FF2B5EF4-FFF2-40B4-BE49-F238E27FC236}">
                 <a16:creationId xmlns:a16="http://schemas.microsoft.com/office/drawing/2014/main" id="{3BDA828A-CCE9-B253-CF7F-D3915FEC0A65}"/>
@@ -3827,7 +3826,7 @@
       <p:sp>
         <p:nvSpPr>
           <p:cNvPr id="71" name="Flowchart: Alternate Process 70">
-            <a:hlinkClick r:id="rId11"/>
+            <a:hlinkClick r:id="rId10"/>
             <a:extLst>
               <a:ext uri="{FF2B5EF4-FFF2-40B4-BE49-F238E27FC236}">
                 <a16:creationId xmlns:a16="http://schemas.microsoft.com/office/drawing/2014/main" id="{70419968-876B-478C-F1B7-99BCC12E0AD3}"/>
@@ -3976,7 +3975,7 @@
       <p:sp>
         <p:nvSpPr>
           <p:cNvPr id="90" name="Flowchart: Alternate Process 89">
-            <a:hlinkClick r:id="rId12"/>
+            <a:hlinkClick r:id="rId11"/>
             <a:extLst>
               <a:ext uri="{FF2B5EF4-FFF2-40B4-BE49-F238E27FC236}">
                 <a16:creationId xmlns:a16="http://schemas.microsoft.com/office/drawing/2014/main" id="{A680ECDD-5EBB-2CAF-F3C5-0FE4D8631D89}"/>
@@ -4115,7 +4114,7 @@
       <p:sp>
         <p:nvSpPr>
           <p:cNvPr id="13" name="Flowchart: Alternate Process 12">
-            <a:hlinkClick r:id="rId13"/>
+            <a:hlinkClick r:id="rId12"/>
             <a:extLst>
               <a:ext uri="{FF2B5EF4-FFF2-40B4-BE49-F238E27FC236}">
                 <a16:creationId xmlns:a16="http://schemas.microsoft.com/office/drawing/2014/main" id="{9A4D5ABA-6E36-F285-6191-76078A46C98C}"/>
@@ -4171,7 +4170,7 @@
       <p:sp>
         <p:nvSpPr>
           <p:cNvPr id="100" name="Flowchart: Alternate Process 99">
-            <a:hlinkClick r:id="rId14"/>
+            <a:hlinkClick r:id="rId13"/>
             <a:extLst>
               <a:ext uri="{FF2B5EF4-FFF2-40B4-BE49-F238E27FC236}">
                 <a16:creationId xmlns:a16="http://schemas.microsoft.com/office/drawing/2014/main" id="{EC22EF62-F8BB-033E-B96F-D99B4202D3CB}"/>
@@ -4354,7 +4353,7 @@
       <p:sp>
         <p:nvSpPr>
           <p:cNvPr id="109" name="Flowchart: Alternate Process 108">
-            <a:hlinkClick r:id="rId15"/>
+            <a:hlinkClick r:id="rId14"/>
             <a:extLst>
               <a:ext uri="{FF2B5EF4-FFF2-40B4-BE49-F238E27FC236}">
                 <a16:creationId xmlns:a16="http://schemas.microsoft.com/office/drawing/2014/main" id="{E0354FCF-4C35-3853-1C8B-238847B20365}"/>
@@ -4676,7 +4675,7 @@
       <p:sp>
         <p:nvSpPr>
           <p:cNvPr id="8" name="Rectangle: Rounded Corners 7">
-            <a:hlinkClick r:id="rId16"/>
+            <a:hlinkClick r:id="rId15"/>
             <a:extLst>
               <a:ext uri="{FF2B5EF4-FFF2-40B4-BE49-F238E27FC236}">
                 <a16:creationId xmlns:a16="http://schemas.microsoft.com/office/drawing/2014/main" id="{9B5276B4-ABD7-AFE4-EE98-6997F6DE83B7}"/>
@@ -4728,7 +4727,7 @@
       <p:sp>
         <p:nvSpPr>
           <p:cNvPr id="26" name="Flowchart: Alternate Process 25">
-            <a:hlinkClick r:id="rId17"/>
+            <a:hlinkClick r:id="rId16"/>
             <a:extLst>
               <a:ext uri="{FF2B5EF4-FFF2-40B4-BE49-F238E27FC236}">
                 <a16:creationId xmlns:a16="http://schemas.microsoft.com/office/drawing/2014/main" id="{DF382876-5FBE-2F8B-D1A0-FCFDE2DD6432}"/>
@@ -4784,7 +4783,7 @@
       <p:sp>
         <p:nvSpPr>
           <p:cNvPr id="28" name="Flowchart: Alternate Process 27">
-            <a:hlinkClick r:id="rId18"/>
+            <a:hlinkClick r:id="rId17"/>
             <a:extLst>
               <a:ext uri="{FF2B5EF4-FFF2-40B4-BE49-F238E27FC236}">
                 <a16:creationId xmlns:a16="http://schemas.microsoft.com/office/drawing/2014/main" id="{83F0037C-2F02-43C2-A050-0C39A4237A61}"/>
@@ -4890,7 +4889,7 @@
       <p:sp>
         <p:nvSpPr>
           <p:cNvPr id="29" name="Flowchart: Alternate Process 28">
-            <a:hlinkClick r:id="rId19"/>
+            <a:hlinkClick r:id="rId18"/>
             <a:extLst>
               <a:ext uri="{FF2B5EF4-FFF2-40B4-BE49-F238E27FC236}">
                 <a16:creationId xmlns:a16="http://schemas.microsoft.com/office/drawing/2014/main" id="{F9B8633C-1D7C-0820-C174-03303D274B8B}"/>
@@ -4996,7 +4995,7 @@
       <p:sp>
         <p:nvSpPr>
           <p:cNvPr id="30" name="Flowchart: Alternate Process 29">
-            <a:hlinkClick r:id="rId20"/>
+            <a:hlinkClick r:id="rId19"/>
             <a:extLst>
               <a:ext uri="{FF2B5EF4-FFF2-40B4-BE49-F238E27FC236}">
                 <a16:creationId xmlns:a16="http://schemas.microsoft.com/office/drawing/2014/main" id="{CAD70C9F-A68A-84DC-0D3D-73A243682A20}"/>
@@ -5099,7 +5098,7 @@
       <p:sp>
         <p:nvSpPr>
           <p:cNvPr id="32" name="Flowchart: Alternate Process 31">
-            <a:hlinkClick r:id="rId21"/>
+            <a:hlinkClick r:id="rId20"/>
             <a:extLst>
               <a:ext uri="{FF2B5EF4-FFF2-40B4-BE49-F238E27FC236}">
                 <a16:creationId xmlns:a16="http://schemas.microsoft.com/office/drawing/2014/main" id="{7B6EDF01-8C27-D9D0-F989-0C28403CE9EA}"/>
@@ -5155,7 +5154,7 @@
       <p:sp>
         <p:nvSpPr>
           <p:cNvPr id="37" name="Flowchart: Alternate Process 36">
-            <a:hlinkClick r:id="rId22"/>
+            <a:hlinkClick r:id="rId21"/>
             <a:extLst>
               <a:ext uri="{FF2B5EF4-FFF2-40B4-BE49-F238E27FC236}">
                 <a16:creationId xmlns:a16="http://schemas.microsoft.com/office/drawing/2014/main" id="{67C9E868-BCAB-045C-EAFB-96CCA4A5F073}"/>
@@ -5211,7 +5210,7 @@
       <p:sp>
         <p:nvSpPr>
           <p:cNvPr id="39" name="Flowchart: Alternate Process 38">
-            <a:hlinkClick r:id="rId23"/>
+            <a:hlinkClick r:id="rId22"/>
             <a:extLst>
               <a:ext uri="{FF2B5EF4-FFF2-40B4-BE49-F238E27FC236}">
                 <a16:creationId xmlns:a16="http://schemas.microsoft.com/office/drawing/2014/main" id="{DE575D25-E07A-4F55-B35B-0C8DBF0D1078}"/>
@@ -5526,7 +5525,6 @@
       <p:sp>
         <p:nvSpPr>
           <p:cNvPr id="23" name="TextBox 22">
-            <a:hlinkClick r:id="rId13"/>
             <a:extLst>
               <a:ext uri="{FF2B5EF4-FFF2-40B4-BE49-F238E27FC236}">
                 <a16:creationId xmlns:a16="http://schemas.microsoft.com/office/drawing/2014/main" id="{0381BCCD-5C91-A76A-96DC-74E4B4D043B6}"/>
@@ -5566,7 +5564,6 @@
       <p:sp>
         <p:nvSpPr>
           <p:cNvPr id="31" name="TextBox 30">
-            <a:hlinkClick r:id="rId13"/>
             <a:extLst>
               <a:ext uri="{FF2B5EF4-FFF2-40B4-BE49-F238E27FC236}">
                 <a16:creationId xmlns:a16="http://schemas.microsoft.com/office/drawing/2014/main" id="{F880E209-014E-2EEC-12B5-32D11A86E0C4}"/>
@@ -5645,7 +5642,7 @@
       <p:sp>
         <p:nvSpPr>
           <p:cNvPr id="3" name="Rectangle: Rounded Corners 2">
-            <a:hlinkClick r:id="rId24"/>
+            <a:hlinkClick r:id="rId23"/>
             <a:extLst>
               <a:ext uri="{FF2B5EF4-FFF2-40B4-BE49-F238E27FC236}">
                 <a16:creationId xmlns:a16="http://schemas.microsoft.com/office/drawing/2014/main" id="{00DD92CF-E092-5CB6-27E5-06C4A792214E}"/>
@@ -5788,13 +5785,13 @@
           <p:nvPr/>
         </p:nvPicPr>
         <p:blipFill>
-          <a:blip r:embed="rId25">
+          <a:blip r:embed="rId24">
             <a:extLst>
               <a:ext uri="{28A0092B-C50C-407E-A947-70E740481C1C}">
                 <a14:useLocalDpi xmlns:a14="http://schemas.microsoft.com/office/drawing/2010/main" val="0"/>
               </a:ext>
               <a:ext uri="{96DAC541-7B7A-43D3-8B79-37D633B846F1}">
-                <asvg:svgBlip xmlns:asvg="http://schemas.microsoft.com/office/drawing/2016/SVG/main" r:embed="rId26"/>
+                <asvg:svgBlip xmlns:asvg="http://schemas.microsoft.com/office/drawing/2016/SVG/main" r:embed="rId25"/>
               </a:ext>
             </a:extLst>
           </a:blip>
@@ -5827,13 +5824,13 @@
           <p:nvPr/>
         </p:nvPicPr>
         <p:blipFill>
-          <a:blip r:embed="rId25">
+          <a:blip r:embed="rId24">
             <a:extLst>
               <a:ext uri="{28A0092B-C50C-407E-A947-70E740481C1C}">
                 <a14:useLocalDpi xmlns:a14="http://schemas.microsoft.com/office/drawing/2010/main" val="0"/>
               </a:ext>
               <a:ext uri="{96DAC541-7B7A-43D3-8B79-37D633B846F1}">
-                <asvg:svgBlip xmlns:asvg="http://schemas.microsoft.com/office/drawing/2016/SVG/main" r:embed="rId26"/>
+                <asvg:svgBlip xmlns:asvg="http://schemas.microsoft.com/office/drawing/2016/SVG/main" r:embed="rId25"/>
               </a:ext>
             </a:extLst>
           </a:blip>
@@ -5854,7 +5851,7 @@
       <p:sp>
         <p:nvSpPr>
           <p:cNvPr id="49" name="Rectangle: Rounded Corners 48">
-            <a:hlinkClick r:id="rId27"/>
+            <a:hlinkClick r:id="rId26"/>
             <a:extLst>
               <a:ext uri="{FF2B5EF4-FFF2-40B4-BE49-F238E27FC236}">
                 <a16:creationId xmlns:a16="http://schemas.microsoft.com/office/drawing/2014/main" id="{E7DFBB98-E80B-7EFB-4C2B-2B1EE150E985}"/>
@@ -5906,7 +5903,7 @@
       <p:pic>
         <p:nvPicPr>
           <p:cNvPr id="52" name="Graphic 51" descr="Envelope with solid fill">
-            <a:hlinkClick r:id="rId28"/>
+            <a:hlinkClick r:id="rId27"/>
             <a:extLst>
               <a:ext uri="{FF2B5EF4-FFF2-40B4-BE49-F238E27FC236}">
                 <a16:creationId xmlns:a16="http://schemas.microsoft.com/office/drawing/2014/main" id="{DBDAD339-A897-63EE-93D3-82769A273E1E}"/>
@@ -5919,13 +5916,13 @@
           <p:nvPr/>
         </p:nvPicPr>
         <p:blipFill>
-          <a:blip r:embed="rId29">
+          <a:blip r:embed="rId28">
             <a:extLst>
               <a:ext uri="{28A0092B-C50C-407E-A947-70E740481C1C}">
                 <a14:useLocalDpi xmlns:a14="http://schemas.microsoft.com/office/drawing/2010/main" val="0"/>
               </a:ext>
               <a:ext uri="{96DAC541-7B7A-43D3-8B79-37D633B846F1}">
-                <asvg:svgBlip xmlns:asvg="http://schemas.microsoft.com/office/drawing/2016/SVG/main" r:embed="rId30"/>
+                <asvg:svgBlip xmlns:asvg="http://schemas.microsoft.com/office/drawing/2016/SVG/main" r:embed="rId29"/>
               </a:ext>
             </a:extLst>
           </a:blip>
@@ -5988,7 +5985,7 @@
       <p:sp>
         <p:nvSpPr>
           <p:cNvPr id="61" name="Flowchart: Alternate Process 60">
-            <a:hlinkClick r:id="rId31"/>
+            <a:hlinkClick r:id="rId30"/>
             <a:extLst>
               <a:ext uri="{FF2B5EF4-FFF2-40B4-BE49-F238E27FC236}">
                 <a16:creationId xmlns:a16="http://schemas.microsoft.com/office/drawing/2014/main" id="{15AFB9DA-6667-C347-E559-E0FF098F734E}"/>
@@ -6044,7 +6041,7 @@
       <p:sp>
         <p:nvSpPr>
           <p:cNvPr id="63" name="Flowchart: Alternate Process 62">
-            <a:hlinkClick r:id="rId32"/>
+            <a:hlinkClick r:id="rId31"/>
             <a:extLst>
               <a:ext uri="{FF2B5EF4-FFF2-40B4-BE49-F238E27FC236}">
                 <a16:creationId xmlns:a16="http://schemas.microsoft.com/office/drawing/2014/main" id="{5B042634-14CC-2DE1-1548-D4FAD418A726}"/>
@@ -6969,7 +6966,7 @@
       <p:sp>
         <p:nvSpPr>
           <p:cNvPr id="73" name="Flowchart: Alternate Process 72">
-            <a:hlinkClick r:id="rId33"/>
+            <a:hlinkClick r:id="rId32"/>
             <a:extLst>
               <a:ext uri="{FF2B5EF4-FFF2-40B4-BE49-F238E27FC236}">
                 <a16:creationId xmlns:a16="http://schemas.microsoft.com/office/drawing/2014/main" id="{0E4270AD-E835-7573-073C-ABEE7D0274BC}"/>
@@ -7034,7 +7031,7 @@
       <p:sp>
         <p:nvSpPr>
           <p:cNvPr id="74" name="Flowchart: Alternate Process 73">
-            <a:hlinkClick r:id="rId34"/>
+            <a:hlinkClick r:id="rId33"/>
             <a:extLst>
               <a:ext uri="{FF2B5EF4-FFF2-40B4-BE49-F238E27FC236}">
                 <a16:creationId xmlns:a16="http://schemas.microsoft.com/office/drawing/2014/main" id="{F7196BD5-BB7B-B765-0213-18EE38BD53EF}"/>
@@ -7099,7 +7096,7 @@
       <p:sp>
         <p:nvSpPr>
           <p:cNvPr id="79" name="Flowchart: Alternate Process 78">
-            <a:hlinkClick r:id="rId35"/>
+            <a:hlinkClick r:id="rId34"/>
             <a:extLst>
               <a:ext uri="{FF2B5EF4-FFF2-40B4-BE49-F238E27FC236}">
                 <a16:creationId xmlns:a16="http://schemas.microsoft.com/office/drawing/2014/main" id="{F6A5C194-B3FC-297C-0CF5-76A9A267EA0E}"/>
@@ -7202,7 +7199,7 @@
       <p:sp>
         <p:nvSpPr>
           <p:cNvPr id="91" name="Flowchart: Alternate Process 90">
-            <a:hlinkClick r:id="rId36"/>
+            <a:hlinkClick r:id="rId35"/>
             <a:extLst>
               <a:ext uri="{FF2B5EF4-FFF2-40B4-BE49-F238E27FC236}">
                 <a16:creationId xmlns:a16="http://schemas.microsoft.com/office/drawing/2014/main" id="{2876BEE6-5BB2-33D7-89E9-FE78B49B136C}"/>
@@ -7369,13 +7366,13 @@
           <p:nvPr/>
         </p:nvPicPr>
         <p:blipFill>
-          <a:blip r:embed="rId25">
+          <a:blip r:embed="rId24">
             <a:extLst>
               <a:ext uri="{28A0092B-C50C-407E-A947-70E740481C1C}">
                 <a14:useLocalDpi xmlns:a14="http://schemas.microsoft.com/office/drawing/2010/main" val="0"/>
               </a:ext>
               <a:ext uri="{96DAC541-7B7A-43D3-8B79-37D633B846F1}">
-                <asvg:svgBlip xmlns:asvg="http://schemas.microsoft.com/office/drawing/2016/SVG/main" r:embed="rId26"/>
+                <asvg:svgBlip xmlns:asvg="http://schemas.microsoft.com/office/drawing/2016/SVG/main" r:embed="rId25"/>
               </a:ext>
             </a:extLst>
           </a:blip>
@@ -7486,7 +7483,7 @@
       <p:sp>
         <p:nvSpPr>
           <p:cNvPr id="9" name="Rectangle: Rounded Corners 8">
-            <a:hlinkClick r:id="rId27"/>
+            <a:hlinkClick r:id="rId36"/>
             <a:extLst>
               <a:ext uri="{FF2B5EF4-FFF2-40B4-BE49-F238E27FC236}">
                 <a16:creationId xmlns:a16="http://schemas.microsoft.com/office/drawing/2014/main" id="{9E2F57AF-1159-24B2-6853-56D6E6A8B326}"/>

</xml_diff>